<commit_message>
Dokumentazioa eta java komentatu
</commit_message>
<xml_diff>
--- a/Aurkezpena/Aurkezpena_5.taldea_2.sprint.pptx
+++ b/Aurkezpena/Aurkezpena_5.taldea_2.sprint.pptx
@@ -223,7 +223,7 @@
           <a:p>
             <a:fld id="{2487B47E-1D1C-43F0-89C4-15CB0C688C8C}" type="datetimeFigureOut">
               <a:rPr lang="es-ES" smtClean="0"/>
-              <a:t>30/04/2024</a:t>
+              <a:t>03/05/2024</a:t>
             </a:fld>
             <a:endParaRPr lang="es-ES"/>
           </a:p>
@@ -3396,7 +3396,7 @@
           <a:p>
             <a:fld id="{A4494A19-2FE0-4714-AFB5-1C06E5FDE156}" type="datetime1">
               <a:rPr lang="es-ES" smtClean="0"/>
-              <a:t>30/04/2024</a:t>
+              <a:t>03/05/2024</a:t>
             </a:fld>
             <a:endParaRPr lang="es-ES"/>
           </a:p>
@@ -4855,7 +4855,7 @@
           <a:p>
             <a:fld id="{0AD4EEB9-D602-4ADA-9638-1CEDB281874F}" type="datetime1">
               <a:rPr lang="es-ES" smtClean="0"/>
-              <a:t>30/04/2024</a:t>
+              <a:t>03/05/2024</a:t>
             </a:fld>
             <a:endParaRPr lang="es-ES"/>
           </a:p>
@@ -6338,7 +6338,7 @@
           <a:p>
             <a:fld id="{2163F725-5AC1-4963-9811-013D7C0CB664}" type="datetime1">
               <a:rPr lang="es-ES" smtClean="0"/>
-              <a:t>30/04/2024</a:t>
+              <a:t>03/05/2024</a:t>
             </a:fld>
             <a:endParaRPr lang="es-ES"/>
           </a:p>
@@ -7823,7 +7823,7 @@
           <a:p>
             <a:fld id="{64904734-3ABD-4097-97A1-89BEEA1A476B}" type="datetime1">
               <a:rPr lang="es-ES" smtClean="0"/>
-              <a:t>30/04/2024</a:t>
+              <a:t>03/05/2024</a:t>
             </a:fld>
             <a:endParaRPr lang="es-ES"/>
           </a:p>
@@ -9361,7 +9361,7 @@
           <a:p>
             <a:fld id="{6DE09703-F0B6-41F1-81EF-5E4F8544FBC6}" type="datetime1">
               <a:rPr lang="es-ES" smtClean="0"/>
-              <a:t>30/04/2024</a:t>
+              <a:t>03/05/2024</a:t>
             </a:fld>
             <a:endParaRPr lang="es-ES"/>
           </a:p>
@@ -10912,7 +10912,7 @@
           <a:p>
             <a:fld id="{B02AAFE6-8E4F-4BE2-A4C9-62D5544A5903}" type="datetime1">
               <a:rPr lang="es-ES" smtClean="0"/>
-              <a:t>30/04/2024</a:t>
+              <a:t>03/05/2024</a:t>
             </a:fld>
             <a:endParaRPr lang="es-ES"/>
           </a:p>
@@ -12607,7 +12607,7 @@
           <a:p>
             <a:fld id="{B3E99D71-489C-4BD7-B47C-BD6232AE68CB}" type="datetime1">
               <a:rPr lang="es-ES" smtClean="0"/>
-              <a:t>30/04/2024</a:t>
+              <a:t>03/05/2024</a:t>
             </a:fld>
             <a:endParaRPr lang="es-ES"/>
           </a:p>
@@ -14035,7 +14035,7 @@
           <a:p>
             <a:fld id="{F2A931DC-EFD8-49DA-8E50-FF5963DC2FD8}" type="datetime1">
               <a:rPr lang="es-ES" smtClean="0"/>
-              <a:t>30/04/2024</a:t>
+              <a:t>03/05/2024</a:t>
             </a:fld>
             <a:endParaRPr lang="es-ES"/>
           </a:p>
@@ -14165,7 +14165,7 @@
           <a:p>
             <a:fld id="{DDE72351-780F-4A81-95E0-AAF05442C245}" type="datetime1">
               <a:rPr lang="es-ES" smtClean="0"/>
-              <a:t>30/04/2024</a:t>
+              <a:t>03/05/2024</a:t>
             </a:fld>
             <a:endParaRPr lang="es-ES"/>
           </a:p>
@@ -15721,7 +15721,7 @@
           <a:p>
             <a:fld id="{6E0BC31F-DB3D-405E-87FE-15795BF92D84}" type="datetime1">
               <a:rPr lang="es-ES" smtClean="0"/>
-              <a:t>30/04/2024</a:t>
+              <a:t>03/05/2024</a:t>
             </a:fld>
             <a:endParaRPr lang="es-ES"/>
           </a:p>
@@ -17287,7 +17287,7 @@
           <a:p>
             <a:fld id="{8FFDA3A6-69A1-4D6C-BC5C-8547B182FC28}" type="datetime1">
               <a:rPr lang="es-ES" smtClean="0"/>
-              <a:t>30/04/2024</a:t>
+              <a:t>03/05/2024</a:t>
             </a:fld>
             <a:endParaRPr lang="es-ES"/>
           </a:p>
@@ -17567,7 +17567,7 @@
           <a:p>
             <a:fld id="{0DEA9F21-826E-48B5-9F6B-EC53318AA5DF}" type="datetime1">
               <a:rPr lang="es-ES" smtClean="0"/>
-              <a:t>30/04/2024</a:t>
+              <a:t>03/05/2024</a:t>
             </a:fld>
             <a:endParaRPr lang="es-ES"/>
           </a:p>
@@ -18095,7 +18095,7 @@
               <a:rPr lang="es-ES" smtClean="0"/>
               <a:t>1</a:t>
             </a:fld>
-            <a:endParaRPr lang="es-ES"/>
+            <a:endParaRPr lang="es-ES" dirty="0"/>
           </a:p>
         </p:txBody>
       </p:sp>
@@ -18708,11 +18708,11 @@
               <a:t> </a:t>
             </a:r>
             <a:r>
-              <a:rPr lang="es-ES" dirty="0" err="1"/>
-              <a:t>agindau</a:t>
+              <a:rPr lang="es-ES" dirty="0" err="1" smtClean="0"/>
+              <a:t>agindua</a:t>
             </a:r>
             <a:r>
-              <a:rPr lang="es-ES" dirty="0"/>
+              <a:rPr lang="es-ES" dirty="0" smtClean="0"/>
               <a:t> </a:t>
             </a:r>
             <a:r>
@@ -20508,20 +20508,20 @@
           <a:lstStyle/>
           <a:p>
             <a:r>
-              <a:rPr lang="es-ES" dirty="0">
+              <a:rPr lang="es-ES" dirty="0" smtClean="0">
                 <a:ea typeface="Calibri Light"/>
                 <a:cs typeface="Calibri Light"/>
               </a:rPr>
               <a:t>Log-</a:t>
             </a:r>
             <a:r>
-              <a:rPr lang="es-ES" dirty="0" err="1">
+              <a:rPr lang="eu-ES" dirty="0" err="1" smtClean="0">
                 <a:ea typeface="Calibri Light"/>
                 <a:cs typeface="Calibri Light"/>
               </a:rPr>
               <a:t>Trigger</a:t>
             </a:r>
-            <a:endParaRPr lang="es-ES" dirty="0" err="1"/>
+            <a:endParaRPr lang="eu-ES" dirty="0"/>
           </a:p>
         </p:txBody>
       </p:sp>
@@ -20564,7 +20564,7 @@
               <a:t> </a:t>
             </a:r>
             <a:r>
-              <a:rPr lang="es-ES" dirty="0" err="1" smtClean="0"/>
+              <a:rPr lang="eu-ES" dirty="0" smtClean="0"/>
               <a:t>bertan</a:t>
             </a:r>
             <a:r>
@@ -21460,11 +21460,11 @@
           <a:lstStyle/>
           <a:p>
             <a:r>
-              <a:rPr lang="es-ES" dirty="0" err="1"/>
-              <a:t>Asoziaozio</a:t>
+              <a:rPr lang="es-ES" dirty="0" err="1" smtClean="0"/>
+              <a:t>Asoziazio</a:t>
             </a:r>
             <a:r>
-              <a:rPr lang="es-ES" dirty="0"/>
+              <a:rPr lang="es-ES" dirty="0" smtClean="0"/>
               <a:t> </a:t>
             </a:r>
             <a:r>
@@ -21485,10 +21485,14 @@
             </a:r>
             <a:r>
               <a:rPr lang="es-ES" dirty="0" err="1"/>
-              <a:t>Produzitutako</a:t>
+              <a:t>p</a:t>
             </a:r>
             <a:r>
-              <a:rPr lang="es-ES" dirty="0"/>
+              <a:rPr lang="es-ES" dirty="0" err="1" smtClean="0"/>
+              <a:t>roduzitutako</a:t>
+            </a:r>
+            <a:r>
+              <a:rPr lang="es-ES" dirty="0" smtClean="0"/>
               <a:t> </a:t>
             </a:r>
             <a:r>

</xml_diff>